<commit_message>
unspecified updates to presentations
</commit_message>
<xml_diff>
--- a/presentations/pptx/06-Purr - tidyverse iterations.pptx
+++ b/presentations/pptx/06-Purr - tidyverse iterations.pptx
@@ -7593,7 +7593,7 @@
             </a:r>
             <a:r>
               <a:rPr lang="en-US" sz="1800" dirty="0" err="1"/>
-              <a:t>runit</a:t>
+              <a:t>runif</a:t>
             </a:r>
             <a:r>
               <a:rPr lang="en-US" sz="1800" dirty="0"/>
@@ -8226,7 +8226,7 @@
             </a:r>
             <a:r>
               <a:rPr lang="en-US" b="1" dirty="0"/>
-              <a:t>implementation is in C code</a:t>
+              <a:t>implementation is in C++ code</a:t>
             </a:r>
             <a:r>
               <a:rPr lang="en-US" dirty="0"/>

</xml_diff>